<commit_message>
edit bug reporting status to be consistent with labels in spreadsheet
</commit_message>
<xml_diff>
--- a/testing/Test-for-Exception.pptx
+++ b/testing/Test-for-Exception.pptx
@@ -55,7 +55,7 @@
       </p:grpSpPr>
       <p:sp>
         <p:nvSpPr>
-          <p:cNvPr id="26" name="PlaceHolder 1"/>
+          <p:cNvPr id="23" name="PlaceHolder 1"/>
           <p:cNvSpPr>
             <a:spLocks noGrp="1"/>
           </p:cNvSpPr>
@@ -66,7 +66,7 @@
         <p:spPr>
           <a:xfrm>
             <a:off x="504000" y="226080"/>
-            <a:ext cx="9071640" cy="946440"/>
+            <a:ext cx="9072000" cy="946440"/>
           </a:xfrm>
           <a:prstGeom prst="rect">
             <a:avLst/>
@@ -86,7 +86,7 @@
       </p:sp>
       <p:sp>
         <p:nvSpPr>
-          <p:cNvPr id="27" name="PlaceHolder 2"/>
+          <p:cNvPr id="24" name="PlaceHolder 2"/>
           <p:cNvSpPr>
             <a:spLocks noGrp="1"/>
           </p:cNvSpPr>
@@ -97,7 +97,7 @@
         <p:spPr>
           <a:xfrm>
             <a:off x="504000" y="1326600"/>
-            <a:ext cx="9071640" cy="1568160"/>
+            <a:ext cx="9072000" cy="1568520"/>
           </a:xfrm>
           <a:prstGeom prst="rect">
             <a:avLst/>
@@ -116,7 +116,7 @@
       </p:sp>
       <p:sp>
         <p:nvSpPr>
-          <p:cNvPr id="28" name="PlaceHolder 3"/>
+          <p:cNvPr id="25" name="PlaceHolder 3"/>
           <p:cNvSpPr>
             <a:spLocks noGrp="1"/>
           </p:cNvSpPr>
@@ -126,8 +126,8 @@
         </p:nvSpPr>
         <p:spPr>
           <a:xfrm>
-            <a:off x="504000" y="3044160"/>
-            <a:ext cx="9071640" cy="1568160"/>
+            <a:off x="504000" y="3044520"/>
+            <a:ext cx="9072000" cy="1568520"/>
           </a:xfrm>
           <a:prstGeom prst="rect">
             <a:avLst/>
@@ -168,7 +168,7 @@
       </p:grpSpPr>
       <p:sp>
         <p:nvSpPr>
-          <p:cNvPr id="29" name="PlaceHolder 1"/>
+          <p:cNvPr id="26" name="PlaceHolder 1"/>
           <p:cNvSpPr>
             <a:spLocks noGrp="1"/>
           </p:cNvSpPr>
@@ -179,7 +179,7 @@
         <p:spPr>
           <a:xfrm>
             <a:off x="504000" y="226080"/>
-            <a:ext cx="9071640" cy="946440"/>
+            <a:ext cx="9072000" cy="946440"/>
           </a:xfrm>
           <a:prstGeom prst="rect">
             <a:avLst/>
@@ -199,7 +199,7 @@
       </p:sp>
       <p:sp>
         <p:nvSpPr>
-          <p:cNvPr id="30" name="PlaceHolder 2"/>
+          <p:cNvPr id="27" name="PlaceHolder 2"/>
           <p:cNvSpPr>
             <a:spLocks noGrp="1"/>
           </p:cNvSpPr>
@@ -210,7 +210,7 @@
         <p:spPr>
           <a:xfrm>
             <a:off x="504000" y="1326600"/>
-            <a:ext cx="4426920" cy="1568160"/>
+            <a:ext cx="4426920" cy="1568520"/>
           </a:xfrm>
           <a:prstGeom prst="rect">
             <a:avLst/>
@@ -229,7 +229,7 @@
       </p:sp>
       <p:sp>
         <p:nvSpPr>
-          <p:cNvPr id="31" name="PlaceHolder 3"/>
+          <p:cNvPr id="28" name="PlaceHolder 3"/>
           <p:cNvSpPr>
             <a:spLocks noGrp="1"/>
           </p:cNvSpPr>
@@ -240,7 +240,7 @@
         <p:spPr>
           <a:xfrm>
             <a:off x="5152680" y="1326600"/>
-            <a:ext cx="4426920" cy="1568160"/>
+            <a:ext cx="4426920" cy="1568520"/>
           </a:xfrm>
           <a:prstGeom prst="rect">
             <a:avLst/>
@@ -259,7 +259,7 @@
       </p:sp>
       <p:sp>
         <p:nvSpPr>
-          <p:cNvPr id="32" name="PlaceHolder 4"/>
+          <p:cNvPr id="29" name="PlaceHolder 4"/>
           <p:cNvSpPr>
             <a:spLocks noGrp="1"/>
           </p:cNvSpPr>
@@ -269,8 +269,8 @@
         </p:nvSpPr>
         <p:spPr>
           <a:xfrm>
-            <a:off x="504000" y="3044160"/>
-            <a:ext cx="4426920" cy="1568160"/>
+            <a:off x="504000" y="3044520"/>
+            <a:ext cx="4426920" cy="1568520"/>
           </a:xfrm>
           <a:prstGeom prst="rect">
             <a:avLst/>
@@ -289,7 +289,7 @@
       </p:sp>
       <p:sp>
         <p:nvSpPr>
-          <p:cNvPr id="33" name="PlaceHolder 5"/>
+          <p:cNvPr id="30" name="PlaceHolder 5"/>
           <p:cNvSpPr>
             <a:spLocks noGrp="1"/>
           </p:cNvSpPr>
@@ -299,8 +299,8 @@
         </p:nvSpPr>
         <p:spPr>
           <a:xfrm>
-            <a:off x="5152680" y="3044160"/>
-            <a:ext cx="4426920" cy="1568160"/>
+            <a:off x="5152680" y="3044520"/>
+            <a:ext cx="4426920" cy="1568520"/>
           </a:xfrm>
           <a:prstGeom prst="rect">
             <a:avLst/>
@@ -341,7 +341,7 @@
       </p:grpSpPr>
       <p:sp>
         <p:nvSpPr>
-          <p:cNvPr id="34" name="PlaceHolder 1"/>
+          <p:cNvPr id="31" name="PlaceHolder 1"/>
           <p:cNvSpPr>
             <a:spLocks noGrp="1"/>
           </p:cNvSpPr>
@@ -352,7 +352,7 @@
         <p:spPr>
           <a:xfrm>
             <a:off x="504000" y="226080"/>
-            <a:ext cx="9071640" cy="946440"/>
+            <a:ext cx="9072000" cy="946440"/>
           </a:xfrm>
           <a:prstGeom prst="rect">
             <a:avLst/>
@@ -372,7 +372,7 @@
       </p:sp>
       <p:sp>
         <p:nvSpPr>
-          <p:cNvPr id="35" name="PlaceHolder 2"/>
+          <p:cNvPr id="32" name="PlaceHolder 2"/>
           <p:cNvSpPr>
             <a:spLocks noGrp="1"/>
           </p:cNvSpPr>
@@ -383,7 +383,7 @@
         <p:spPr>
           <a:xfrm>
             <a:off x="504000" y="1326600"/>
-            <a:ext cx="2920680" cy="1568160"/>
+            <a:ext cx="2921040" cy="1568520"/>
           </a:xfrm>
           <a:prstGeom prst="rect">
             <a:avLst/>
@@ -402,7 +402,7 @@
       </p:sp>
       <p:sp>
         <p:nvSpPr>
-          <p:cNvPr id="36" name="PlaceHolder 3"/>
+          <p:cNvPr id="33" name="PlaceHolder 3"/>
           <p:cNvSpPr>
             <a:spLocks noGrp="1"/>
           </p:cNvSpPr>
@@ -412,8 +412,8 @@
         </p:nvSpPr>
         <p:spPr>
           <a:xfrm>
-            <a:off x="3571200" y="1326600"/>
-            <a:ext cx="2920680" cy="1568160"/>
+            <a:off x="3571560" y="1326600"/>
+            <a:ext cx="2921040" cy="1568520"/>
           </a:xfrm>
           <a:prstGeom prst="rect">
             <a:avLst/>
@@ -432,7 +432,7 @@
       </p:sp>
       <p:sp>
         <p:nvSpPr>
-          <p:cNvPr id="37" name="PlaceHolder 4"/>
+          <p:cNvPr id="34" name="PlaceHolder 4"/>
           <p:cNvSpPr>
             <a:spLocks noGrp="1"/>
           </p:cNvSpPr>
@@ -442,8 +442,8 @@
         </p:nvSpPr>
         <p:spPr>
           <a:xfrm>
-            <a:off x="6638040" y="1326600"/>
-            <a:ext cx="2920680" cy="1568160"/>
+            <a:off x="6639120" y="1326600"/>
+            <a:ext cx="2921040" cy="1568520"/>
           </a:xfrm>
           <a:prstGeom prst="rect">
             <a:avLst/>
@@ -462,7 +462,7 @@
       </p:sp>
       <p:sp>
         <p:nvSpPr>
-          <p:cNvPr id="38" name="PlaceHolder 5"/>
+          <p:cNvPr id="35" name="PlaceHolder 5"/>
           <p:cNvSpPr>
             <a:spLocks noGrp="1"/>
           </p:cNvSpPr>
@@ -472,8 +472,8 @@
         </p:nvSpPr>
         <p:spPr>
           <a:xfrm>
-            <a:off x="504000" y="3044160"/>
-            <a:ext cx="2920680" cy="1568160"/>
+            <a:off x="504000" y="3044520"/>
+            <a:ext cx="2921040" cy="1568520"/>
           </a:xfrm>
           <a:prstGeom prst="rect">
             <a:avLst/>
@@ -492,7 +492,7 @@
       </p:sp>
       <p:sp>
         <p:nvSpPr>
-          <p:cNvPr id="39" name="PlaceHolder 6"/>
+          <p:cNvPr id="36" name="PlaceHolder 6"/>
           <p:cNvSpPr>
             <a:spLocks noGrp="1"/>
           </p:cNvSpPr>
@@ -502,8 +502,8 @@
         </p:nvSpPr>
         <p:spPr>
           <a:xfrm>
-            <a:off x="3571200" y="3044160"/>
-            <a:ext cx="2920680" cy="1568160"/>
+            <a:off x="3571560" y="3044520"/>
+            <a:ext cx="2921040" cy="1568520"/>
           </a:xfrm>
           <a:prstGeom prst="rect">
             <a:avLst/>
@@ -522,7 +522,7 @@
       </p:sp>
       <p:sp>
         <p:nvSpPr>
-          <p:cNvPr id="40" name="PlaceHolder 7"/>
+          <p:cNvPr id="37" name="PlaceHolder 7"/>
           <p:cNvSpPr>
             <a:spLocks noGrp="1"/>
           </p:cNvSpPr>
@@ -532,8 +532,8 @@
         </p:nvSpPr>
         <p:spPr>
           <a:xfrm>
-            <a:off x="6638040" y="3044160"/>
-            <a:ext cx="2920680" cy="1568160"/>
+            <a:off x="6639120" y="3044520"/>
+            <a:ext cx="2921040" cy="1568520"/>
           </a:xfrm>
           <a:prstGeom prst="rect">
             <a:avLst/>
@@ -574,7 +574,7 @@
       </p:grpSpPr>
       <p:sp>
         <p:nvSpPr>
-          <p:cNvPr id="5" name="PlaceHolder 1"/>
+          <p:cNvPr id="2" name="PlaceHolder 1"/>
           <p:cNvSpPr>
             <a:spLocks noGrp="1"/>
           </p:cNvSpPr>
@@ -585,7 +585,7 @@
         <p:spPr>
           <a:xfrm>
             <a:off x="504000" y="226080"/>
-            <a:ext cx="9071640" cy="946440"/>
+            <a:ext cx="9072000" cy="946440"/>
           </a:xfrm>
           <a:prstGeom prst="rect">
             <a:avLst/>
@@ -605,7 +605,7 @@
       </p:sp>
       <p:sp>
         <p:nvSpPr>
-          <p:cNvPr id="6" name="PlaceHolder 2"/>
+          <p:cNvPr id="3" name="PlaceHolder 2"/>
           <p:cNvSpPr>
             <a:spLocks noGrp="1"/>
           </p:cNvSpPr>
@@ -616,7 +616,7 @@
         <p:spPr>
           <a:xfrm>
             <a:off x="504000" y="1326600"/>
-            <a:ext cx="9071640" cy="3288240"/>
+            <a:ext cx="9072000" cy="3288600"/>
           </a:xfrm>
           <a:prstGeom prst="rect">
             <a:avLst/>
@@ -658,7 +658,7 @@
       </p:grpSpPr>
       <p:sp>
         <p:nvSpPr>
-          <p:cNvPr id="7" name="PlaceHolder 1"/>
+          <p:cNvPr id="4" name="PlaceHolder 1"/>
           <p:cNvSpPr>
             <a:spLocks noGrp="1"/>
           </p:cNvSpPr>
@@ -669,7 +669,7 @@
         <p:spPr>
           <a:xfrm>
             <a:off x="504000" y="226080"/>
-            <a:ext cx="9071640" cy="946440"/>
+            <a:ext cx="9072000" cy="946440"/>
           </a:xfrm>
           <a:prstGeom prst="rect">
             <a:avLst/>
@@ -689,7 +689,7 @@
       </p:sp>
       <p:sp>
         <p:nvSpPr>
-          <p:cNvPr id="8" name="PlaceHolder 2"/>
+          <p:cNvPr id="5" name="PlaceHolder 2"/>
           <p:cNvSpPr>
             <a:spLocks noGrp="1"/>
           </p:cNvSpPr>
@@ -700,7 +700,7 @@
         <p:spPr>
           <a:xfrm>
             <a:off x="504000" y="1326600"/>
-            <a:ext cx="9071640" cy="3288240"/>
+            <a:ext cx="9072000" cy="3288600"/>
           </a:xfrm>
           <a:prstGeom prst="rect">
             <a:avLst/>
@@ -741,7 +741,7 @@
       </p:grpSpPr>
       <p:sp>
         <p:nvSpPr>
-          <p:cNvPr id="9" name="PlaceHolder 1"/>
+          <p:cNvPr id="6" name="PlaceHolder 1"/>
           <p:cNvSpPr>
             <a:spLocks noGrp="1"/>
           </p:cNvSpPr>
@@ -752,7 +752,7 @@
         <p:spPr>
           <a:xfrm>
             <a:off x="504000" y="226080"/>
-            <a:ext cx="9071640" cy="946440"/>
+            <a:ext cx="9072000" cy="946440"/>
           </a:xfrm>
           <a:prstGeom prst="rect">
             <a:avLst/>
@@ -772,7 +772,7 @@
       </p:sp>
       <p:sp>
         <p:nvSpPr>
-          <p:cNvPr id="10" name="PlaceHolder 2"/>
+          <p:cNvPr id="7" name="PlaceHolder 2"/>
           <p:cNvSpPr>
             <a:spLocks noGrp="1"/>
           </p:cNvSpPr>
@@ -783,7 +783,7 @@
         <p:spPr>
           <a:xfrm>
             <a:off x="504000" y="1326600"/>
-            <a:ext cx="4426920" cy="3288240"/>
+            <a:ext cx="4426920" cy="3288600"/>
           </a:xfrm>
           <a:prstGeom prst="rect">
             <a:avLst/>
@@ -802,7 +802,7 @@
       </p:sp>
       <p:sp>
         <p:nvSpPr>
-          <p:cNvPr id="11" name="PlaceHolder 3"/>
+          <p:cNvPr id="8" name="PlaceHolder 3"/>
           <p:cNvSpPr>
             <a:spLocks noGrp="1"/>
           </p:cNvSpPr>
@@ -813,7 +813,7 @@
         <p:spPr>
           <a:xfrm>
             <a:off x="5152680" y="1326600"/>
-            <a:ext cx="4426920" cy="3288240"/>
+            <a:ext cx="4426920" cy="3288600"/>
           </a:xfrm>
           <a:prstGeom prst="rect">
             <a:avLst/>
@@ -854,7 +854,7 @@
       </p:grpSpPr>
       <p:sp>
         <p:nvSpPr>
-          <p:cNvPr id="12" name="PlaceHolder 1"/>
+          <p:cNvPr id="9" name="PlaceHolder 1"/>
           <p:cNvSpPr>
             <a:spLocks noGrp="1"/>
           </p:cNvSpPr>
@@ -865,7 +865,7 @@
         <p:spPr>
           <a:xfrm>
             <a:off x="504000" y="226080"/>
-            <a:ext cx="9071640" cy="946440"/>
+            <a:ext cx="9072000" cy="946440"/>
           </a:xfrm>
           <a:prstGeom prst="rect">
             <a:avLst/>
@@ -907,7 +907,7 @@
       </p:grpSpPr>
       <p:sp>
         <p:nvSpPr>
-          <p:cNvPr id="13" name="PlaceHolder 1"/>
+          <p:cNvPr id="10" name="PlaceHolder 1"/>
           <p:cNvSpPr>
             <a:spLocks noGrp="1"/>
           </p:cNvSpPr>
@@ -918,7 +918,7 @@
         <p:spPr>
           <a:xfrm>
             <a:off x="504000" y="226080"/>
-            <a:ext cx="9071640" cy="4388400"/>
+            <a:ext cx="9072000" cy="4388400"/>
           </a:xfrm>
           <a:prstGeom prst="rect">
             <a:avLst/>
@@ -960,7 +960,7 @@
       </p:grpSpPr>
       <p:sp>
         <p:nvSpPr>
-          <p:cNvPr id="14" name="PlaceHolder 1"/>
+          <p:cNvPr id="11" name="PlaceHolder 1"/>
           <p:cNvSpPr>
             <a:spLocks noGrp="1"/>
           </p:cNvSpPr>
@@ -971,7 +971,7 @@
         <p:spPr>
           <a:xfrm>
             <a:off x="504000" y="226080"/>
-            <a:ext cx="9071640" cy="946440"/>
+            <a:ext cx="9072000" cy="946440"/>
           </a:xfrm>
           <a:prstGeom prst="rect">
             <a:avLst/>
@@ -991,7 +991,7 @@
       </p:sp>
       <p:sp>
         <p:nvSpPr>
-          <p:cNvPr id="15" name="PlaceHolder 2"/>
+          <p:cNvPr id="12" name="PlaceHolder 2"/>
           <p:cNvSpPr>
             <a:spLocks noGrp="1"/>
           </p:cNvSpPr>
@@ -1002,7 +1002,7 @@
         <p:spPr>
           <a:xfrm>
             <a:off x="504000" y="1326600"/>
-            <a:ext cx="4426920" cy="1568160"/>
+            <a:ext cx="4426920" cy="1568520"/>
           </a:xfrm>
           <a:prstGeom prst="rect">
             <a:avLst/>
@@ -1021,7 +1021,7 @@
       </p:sp>
       <p:sp>
         <p:nvSpPr>
-          <p:cNvPr id="16" name="PlaceHolder 3"/>
+          <p:cNvPr id="13" name="PlaceHolder 3"/>
           <p:cNvSpPr>
             <a:spLocks noGrp="1"/>
           </p:cNvSpPr>
@@ -1032,7 +1032,7 @@
         <p:spPr>
           <a:xfrm>
             <a:off x="5152680" y="1326600"/>
-            <a:ext cx="4426920" cy="3288240"/>
+            <a:ext cx="4426920" cy="3288600"/>
           </a:xfrm>
           <a:prstGeom prst="rect">
             <a:avLst/>
@@ -1051,7 +1051,7 @@
       </p:sp>
       <p:sp>
         <p:nvSpPr>
-          <p:cNvPr id="17" name="PlaceHolder 4"/>
+          <p:cNvPr id="14" name="PlaceHolder 4"/>
           <p:cNvSpPr>
             <a:spLocks noGrp="1"/>
           </p:cNvSpPr>
@@ -1061,8 +1061,8 @@
         </p:nvSpPr>
         <p:spPr>
           <a:xfrm>
-            <a:off x="504000" y="3044160"/>
-            <a:ext cx="4426920" cy="1568160"/>
+            <a:off x="504000" y="3044520"/>
+            <a:ext cx="4426920" cy="1568520"/>
           </a:xfrm>
           <a:prstGeom prst="rect">
             <a:avLst/>
@@ -1103,7 +1103,7 @@
       </p:grpSpPr>
       <p:sp>
         <p:nvSpPr>
-          <p:cNvPr id="18" name="PlaceHolder 1"/>
+          <p:cNvPr id="15" name="PlaceHolder 1"/>
           <p:cNvSpPr>
             <a:spLocks noGrp="1"/>
           </p:cNvSpPr>
@@ -1114,7 +1114,7 @@
         <p:spPr>
           <a:xfrm>
             <a:off x="504000" y="226080"/>
-            <a:ext cx="9071640" cy="946440"/>
+            <a:ext cx="9072000" cy="946440"/>
           </a:xfrm>
           <a:prstGeom prst="rect">
             <a:avLst/>
@@ -1134,7 +1134,7 @@
       </p:sp>
       <p:sp>
         <p:nvSpPr>
-          <p:cNvPr id="19" name="PlaceHolder 2"/>
+          <p:cNvPr id="16" name="PlaceHolder 2"/>
           <p:cNvSpPr>
             <a:spLocks noGrp="1"/>
           </p:cNvSpPr>
@@ -1145,7 +1145,7 @@
         <p:spPr>
           <a:xfrm>
             <a:off x="504000" y="1326600"/>
-            <a:ext cx="4426920" cy="3288240"/>
+            <a:ext cx="4426920" cy="3288600"/>
           </a:xfrm>
           <a:prstGeom prst="rect">
             <a:avLst/>
@@ -1164,7 +1164,7 @@
       </p:sp>
       <p:sp>
         <p:nvSpPr>
-          <p:cNvPr id="20" name="PlaceHolder 3"/>
+          <p:cNvPr id="17" name="PlaceHolder 3"/>
           <p:cNvSpPr>
             <a:spLocks noGrp="1"/>
           </p:cNvSpPr>
@@ -1175,7 +1175,7 @@
         <p:spPr>
           <a:xfrm>
             <a:off x="5152680" y="1326600"/>
-            <a:ext cx="4426920" cy="1568160"/>
+            <a:ext cx="4426920" cy="1568520"/>
           </a:xfrm>
           <a:prstGeom prst="rect">
             <a:avLst/>
@@ -1194,7 +1194,7 @@
       </p:sp>
       <p:sp>
         <p:nvSpPr>
-          <p:cNvPr id="21" name="PlaceHolder 4"/>
+          <p:cNvPr id="18" name="PlaceHolder 4"/>
           <p:cNvSpPr>
             <a:spLocks noGrp="1"/>
           </p:cNvSpPr>
@@ -1204,8 +1204,8 @@
         </p:nvSpPr>
         <p:spPr>
           <a:xfrm>
-            <a:off x="5152680" y="3044160"/>
-            <a:ext cx="4426920" cy="1568160"/>
+            <a:off x="5152680" y="3044520"/>
+            <a:ext cx="4426920" cy="1568520"/>
           </a:xfrm>
           <a:prstGeom prst="rect">
             <a:avLst/>
@@ -1246,7 +1246,7 @@
       </p:grpSpPr>
       <p:sp>
         <p:nvSpPr>
-          <p:cNvPr id="22" name="PlaceHolder 1"/>
+          <p:cNvPr id="19" name="PlaceHolder 1"/>
           <p:cNvSpPr>
             <a:spLocks noGrp="1"/>
           </p:cNvSpPr>
@@ -1257,7 +1257,7 @@
         <p:spPr>
           <a:xfrm>
             <a:off x="504000" y="226080"/>
-            <a:ext cx="9071640" cy="946440"/>
+            <a:ext cx="9072000" cy="946440"/>
           </a:xfrm>
           <a:prstGeom prst="rect">
             <a:avLst/>
@@ -1277,7 +1277,7 @@
       </p:sp>
       <p:sp>
         <p:nvSpPr>
-          <p:cNvPr id="23" name="PlaceHolder 2"/>
+          <p:cNvPr id="20" name="PlaceHolder 2"/>
           <p:cNvSpPr>
             <a:spLocks noGrp="1"/>
           </p:cNvSpPr>
@@ -1288,7 +1288,7 @@
         <p:spPr>
           <a:xfrm>
             <a:off x="504000" y="1326600"/>
-            <a:ext cx="4426920" cy="1568160"/>
+            <a:ext cx="4426920" cy="1568520"/>
           </a:xfrm>
           <a:prstGeom prst="rect">
             <a:avLst/>
@@ -1307,7 +1307,7 @@
       </p:sp>
       <p:sp>
         <p:nvSpPr>
-          <p:cNvPr id="24" name="PlaceHolder 3"/>
+          <p:cNvPr id="21" name="PlaceHolder 3"/>
           <p:cNvSpPr>
             <a:spLocks noGrp="1"/>
           </p:cNvSpPr>
@@ -1318,7 +1318,7 @@
         <p:spPr>
           <a:xfrm>
             <a:off x="5152680" y="1326600"/>
-            <a:ext cx="4426920" cy="1568160"/>
+            <a:ext cx="4426920" cy="1568520"/>
           </a:xfrm>
           <a:prstGeom prst="rect">
             <a:avLst/>
@@ -1337,7 +1337,7 @@
       </p:sp>
       <p:sp>
         <p:nvSpPr>
-          <p:cNvPr id="25" name="PlaceHolder 4"/>
+          <p:cNvPr id="22" name="PlaceHolder 4"/>
           <p:cNvSpPr>
             <a:spLocks noGrp="1"/>
           </p:cNvSpPr>
@@ -1347,8 +1347,8 @@
         </p:nvSpPr>
         <p:spPr>
           <a:xfrm>
-            <a:off x="504000" y="3044160"/>
-            <a:ext cx="9071640" cy="1568160"/>
+            <a:off x="504000" y="3044520"/>
+            <a:ext cx="9072000" cy="1568520"/>
           </a:xfrm>
           <a:prstGeom prst="rect">
             <a:avLst/>
@@ -1400,7 +1400,7 @@
         <p:spPr>
           <a:xfrm>
             <a:off x="504000" y="226080"/>
-            <a:ext cx="9071640" cy="946440"/>
+            <a:ext cx="9072000" cy="946440"/>
           </a:xfrm>
           <a:prstGeom prst="rect">
             <a:avLst/>
@@ -1437,7 +1437,7 @@
         <p:spPr>
           <a:xfrm>
             <a:off x="504000" y="1326600"/>
-            <a:ext cx="9071640" cy="3288240"/>
+            <a:ext cx="9072000" cy="3288600"/>
           </a:xfrm>
           <a:prstGeom prst="rect">
             <a:avLst/>
@@ -1599,116 +1599,6 @@
             </a:r>
             <a:endParaRPr b="0" lang="en-US" sz="2000" spc="-1" strike="noStrike">
               <a:latin typeface="Arial"/>
-            </a:endParaRPr>
-          </a:p>
-        </p:txBody>
-      </p:sp>
-      <p:sp>
-        <p:nvSpPr>
-          <p:cNvPr id="2" name="PlaceHolder 3"/>
-          <p:cNvSpPr>
-            <a:spLocks noGrp="1"/>
-          </p:cNvSpPr>
-          <p:nvPr>
-            <p:ph type="dt"/>
-          </p:nvPr>
-        </p:nvSpPr>
-        <p:spPr>
-          <a:xfrm>
-            <a:off x="504000" y="5165280"/>
-            <a:ext cx="2348280" cy="390600"/>
-          </a:xfrm>
-          <a:prstGeom prst="rect">
-            <a:avLst/>
-          </a:prstGeom>
-        </p:spPr>
-        <p:txBody>
-          <a:bodyPr lIns="0" rIns="0" tIns="0" bIns="0">
-            <a:noAutofit/>
-          </a:bodyPr>
-          <a:p>
-            <a:r>
-              <a:rPr b="0" lang="en-US" sz="1400" spc="-1" strike="noStrike">
-                <a:latin typeface="Times New Roman"/>
-              </a:rPr>
-              <a:t>&lt;date/time&gt;</a:t>
-            </a:r>
-            <a:endParaRPr b="0" lang="en-US" sz="1400" spc="-1" strike="noStrike">
-              <a:latin typeface="Times New Roman"/>
-            </a:endParaRPr>
-          </a:p>
-        </p:txBody>
-      </p:sp>
-      <p:sp>
-        <p:nvSpPr>
-          <p:cNvPr id="3" name="PlaceHolder 4"/>
-          <p:cNvSpPr>
-            <a:spLocks noGrp="1"/>
-          </p:cNvSpPr>
-          <p:nvPr>
-            <p:ph type="ftr"/>
-          </p:nvPr>
-        </p:nvSpPr>
-        <p:spPr>
-          <a:xfrm>
-            <a:off x="3447360" y="5165280"/>
-            <a:ext cx="3195000" cy="390600"/>
-          </a:xfrm>
-          <a:prstGeom prst="rect">
-            <a:avLst/>
-          </a:prstGeom>
-        </p:spPr>
-        <p:txBody>
-          <a:bodyPr lIns="0" rIns="0" tIns="0" bIns="0">
-            <a:noAutofit/>
-          </a:bodyPr>
-          <a:p>
-            <a:pPr algn="ctr"/>
-            <a:r>
-              <a:rPr b="0" lang="en-US" sz="1400" spc="-1" strike="noStrike">
-                <a:latin typeface="Times New Roman"/>
-              </a:rPr>
-              <a:t>&lt;footer&gt;</a:t>
-            </a:r>
-            <a:endParaRPr b="0" lang="en-US" sz="1400" spc="-1" strike="noStrike">
-              <a:latin typeface="Times New Roman"/>
-            </a:endParaRPr>
-          </a:p>
-        </p:txBody>
-      </p:sp>
-      <p:sp>
-        <p:nvSpPr>
-          <p:cNvPr id="4" name="PlaceHolder 5"/>
-          <p:cNvSpPr>
-            <a:spLocks noGrp="1"/>
-          </p:cNvSpPr>
-          <p:nvPr>
-            <p:ph type="sldNum"/>
-          </p:nvPr>
-        </p:nvSpPr>
-        <p:spPr>
-          <a:xfrm>
-            <a:off x="7227360" y="5165280"/>
-            <a:ext cx="2348280" cy="390600"/>
-          </a:xfrm>
-          <a:prstGeom prst="rect">
-            <a:avLst/>
-          </a:prstGeom>
-        </p:spPr>
-        <p:txBody>
-          <a:bodyPr lIns="0" rIns="0" tIns="0" bIns="0">
-            <a:noAutofit/>
-          </a:bodyPr>
-          <a:p>
-            <a:pPr algn="r"/>
-            <a:fld id="{DE22DA46-6E4A-4D73-9863-B480D40F3B62}" type="slidenum">
-              <a:rPr b="0" lang="en-US" sz="1400" spc="-1" strike="noStrike">
-                <a:latin typeface="Times New Roman"/>
-              </a:rPr>
-              <a:t>&lt;number&gt;</a:t>
-            </a:fld>
-            <a:endParaRPr b="0" lang="en-US" sz="1400" spc="-1" strike="noStrike">
-              <a:latin typeface="Times New Roman"/>
             </a:endParaRPr>
           </a:p>
         </p:txBody>
@@ -1759,14 +1649,14 @@
       </p:grpSpPr>
       <p:sp>
         <p:nvSpPr>
-          <p:cNvPr id="41" name="CustomShape 1"/>
+          <p:cNvPr id="38" name="CustomShape 1"/>
           <p:cNvSpPr/>
           <p:nvPr/>
         </p:nvSpPr>
         <p:spPr>
           <a:xfrm>
             <a:off x="673560" y="214920"/>
-            <a:ext cx="8714160" cy="701640"/>
+            <a:ext cx="8713800" cy="701280"/>
           </a:xfrm>
           <a:prstGeom prst="rect">
             <a:avLst/>
@@ -1845,14 +1735,14 @@
       </p:sp>
       <p:sp>
         <p:nvSpPr>
-          <p:cNvPr id="42" name="CustomShape 2"/>
+          <p:cNvPr id="39" name="CustomShape 2"/>
           <p:cNvSpPr/>
           <p:nvPr/>
         </p:nvSpPr>
         <p:spPr>
           <a:xfrm>
             <a:off x="605160" y="1057680"/>
-            <a:ext cx="9071280" cy="3785760"/>
+            <a:ext cx="9070920" cy="3785400"/>
           </a:xfrm>
           <a:custGeom>
             <a:avLst/>
@@ -2466,14 +2356,14 @@
       </p:grpSpPr>
       <p:sp>
         <p:nvSpPr>
-          <p:cNvPr id="43" name="CustomShape 1"/>
+          <p:cNvPr id="40" name="CustomShape 1"/>
           <p:cNvSpPr/>
           <p:nvPr/>
         </p:nvSpPr>
         <p:spPr>
           <a:xfrm>
             <a:off x="673560" y="214920"/>
-            <a:ext cx="8714160" cy="701640"/>
+            <a:ext cx="8713800" cy="701280"/>
           </a:xfrm>
           <a:prstGeom prst="rect">
             <a:avLst/>
@@ -2552,14 +2442,14 @@
       </p:sp>
       <p:sp>
         <p:nvSpPr>
-          <p:cNvPr id="44" name="CustomShape 2"/>
+          <p:cNvPr id="41" name="CustomShape 2"/>
           <p:cNvSpPr/>
           <p:nvPr/>
         </p:nvSpPr>
         <p:spPr>
           <a:xfrm>
             <a:off x="605160" y="1587960"/>
-            <a:ext cx="9071280" cy="3427920"/>
+            <a:ext cx="9070920" cy="3427920"/>
           </a:xfrm>
           <a:custGeom>
             <a:avLst/>
@@ -2795,7 +2685,7 @@
                 <a:latin typeface="Courier New"/>
                 <a:ea typeface="Courier New"/>
               </a:rPr>
-              <a:t>self.assertRaises(ValueError):</a:t>
+              <a:t>with self.assertRaises(ValueError):</a:t>
             </a:r>
             <a:endParaRPr b="0" lang="en-US" sz="2200" spc="-1" strike="noStrike">
               <a:latin typeface="Arial"/>
@@ -3087,14 +2977,14 @@
       </p:sp>
       <p:sp>
         <p:nvSpPr>
-          <p:cNvPr id="45" name="CustomShape 3"/>
+          <p:cNvPr id="42" name="CustomShape 3"/>
           <p:cNvSpPr/>
           <p:nvPr/>
         </p:nvSpPr>
         <p:spPr>
           <a:xfrm>
             <a:off x="673560" y="917280"/>
-            <a:ext cx="9002880" cy="427320"/>
+            <a:ext cx="9002520" cy="426960"/>
           </a:xfrm>
           <a:custGeom>
             <a:avLst/>
@@ -3233,14 +3123,14 @@
       </p:grpSpPr>
       <p:sp>
         <p:nvSpPr>
-          <p:cNvPr id="46" name="CustomShape 1"/>
+          <p:cNvPr id="43" name="CustomShape 1"/>
           <p:cNvSpPr/>
           <p:nvPr/>
         </p:nvSpPr>
         <p:spPr>
           <a:xfrm>
             <a:off x="673560" y="501120"/>
-            <a:ext cx="8714160" cy="701640"/>
+            <a:ext cx="8713800" cy="701280"/>
           </a:xfrm>
           <a:prstGeom prst="rect">
             <a:avLst/>
@@ -3330,14 +3220,14 @@
       </p:sp>
       <p:sp>
         <p:nvSpPr>
-          <p:cNvPr id="47" name="CustomShape 2"/>
+          <p:cNvPr id="44" name="CustomShape 2"/>
           <p:cNvSpPr/>
           <p:nvPr/>
         </p:nvSpPr>
         <p:spPr>
           <a:xfrm>
             <a:off x="673920" y="1096920"/>
-            <a:ext cx="9002880" cy="4020840"/>
+            <a:ext cx="9002520" cy="4020480"/>
           </a:xfrm>
           <a:custGeom>
             <a:avLst/>
@@ -3421,7 +3311,7 @@
                 <a:tab algn="l" pos="10762920"/>
               </a:tabLst>
             </a:pPr>
-            <a:endParaRPr b="0" lang="en-US" sz="1490" spc="-1" strike="noStrike">
+            <a:endParaRPr b="0" lang="en-US" sz="1800" spc="-1" strike="noStrike">
               <a:latin typeface="Arial"/>
             </a:endParaRPr>
           </a:p>

</xml_diff>